<commit_message>
Màj et fin du ppt.
</commit_message>
<xml_diff>
--- a/pst.pptx
+++ b/pst.pptx
@@ -5,7 +5,7 @@
     <p:sldMasterId id="2147483648" r:id="rId1"/>
   </p:sldMasterIdLst>
   <p:notesMasterIdLst>
-    <p:notesMasterId r:id="rId11"/>
+    <p:notesMasterId r:id="rId10"/>
   </p:notesMasterIdLst>
   <p:sldIdLst>
     <p:sldId id="257" r:id="rId2"/>
@@ -14,9 +14,8 @@
     <p:sldId id="260" r:id="rId5"/>
     <p:sldId id="261" r:id="rId6"/>
     <p:sldId id="262" r:id="rId7"/>
-    <p:sldId id="263" r:id="rId8"/>
-    <p:sldId id="264" r:id="rId9"/>
-    <p:sldId id="265" r:id="rId10"/>
+    <p:sldId id="264" r:id="rId8"/>
+    <p:sldId id="265" r:id="rId9"/>
   </p:sldIdLst>
   <p:sldSz cx="9144000" cy="5715000" type="screen16x10"/>
   <p:notesSz cx="6858000" cy="9144000"/>
@@ -1127,90 +1126,6 @@
             <a:fld id="{DA8FA8B5-ADBB-4D4D-9D16-C29BFAE63E73}" type="slidenum">
               <a:rPr lang="fr-FR" smtClean="0"/>
               <a:t>8</a:t>
-            </a:fld>
-            <a:endParaRPr lang="fr-FR"/>
-          </a:p>
-        </p:txBody>
-      </p:sp>
-    </p:spTree>
-    <p:extLst>
-      <p:ext uri="{BB962C8B-B14F-4D97-AF65-F5344CB8AC3E}">
-        <p14:creationId xmlns:p14="http://schemas.microsoft.com/office/powerpoint/2010/main" val="3306396304"/>
-      </p:ext>
-    </p:extLst>
-  </p:cSld>
-  <p:clrMapOvr>
-    <a:masterClrMapping/>
-  </p:clrMapOvr>
-</p:notes>
-</file>
-
-<file path=ppt/notesSlides/notesSlide9.xml><?xml version="1.0" encoding="utf-8"?>
-<p:notes xmlns:a="http://schemas.openxmlformats.org/drawingml/2006/main" xmlns:r="http://schemas.openxmlformats.org/officeDocument/2006/relationships" xmlns:p="http://schemas.openxmlformats.org/presentationml/2006/main">
-  <p:cSld>
-    <p:spTree>
-      <p:nvGrpSpPr>
-        <p:cNvPr id="1" name=""/>
-        <p:cNvGrpSpPr/>
-        <p:nvPr/>
-      </p:nvGrpSpPr>
-      <p:grpSpPr>
-        <a:xfrm>
-          <a:off x="0" y="0"/>
-          <a:ext cx="0" cy="0"/>
-          <a:chOff x="0" y="0"/>
-          <a:chExt cx="0" cy="0"/>
-        </a:xfrm>
-      </p:grpSpPr>
-      <p:sp>
-        <p:nvSpPr>
-          <p:cNvPr id="2" name="Espace réservé de l'image des diapositives 1"/>
-          <p:cNvSpPr>
-            <a:spLocks noGrp="1" noRot="1" noChangeAspect="1"/>
-          </p:cNvSpPr>
-          <p:nvPr>
-            <p:ph type="sldImg"/>
-          </p:nvPr>
-        </p:nvSpPr>
-        <p:spPr/>
-      </p:sp>
-      <p:sp>
-        <p:nvSpPr>
-          <p:cNvPr id="3" name="Espace réservé des commentaires 2"/>
-          <p:cNvSpPr>
-            <a:spLocks noGrp="1"/>
-          </p:cNvSpPr>
-          <p:nvPr>
-            <p:ph type="body" idx="1"/>
-          </p:nvPr>
-        </p:nvSpPr>
-        <p:spPr/>
-        <p:txBody>
-          <a:bodyPr/>
-          <a:lstStyle/>
-          <a:p>
-            <a:endParaRPr lang="de-DE" noProof="0" dirty="0"/>
-          </a:p>
-        </p:txBody>
-      </p:sp>
-      <p:sp>
-        <p:nvSpPr>
-          <p:cNvPr id="4" name="Espace réservé du numéro de diapositive 3"/>
-          <p:cNvSpPr>
-            <a:spLocks noGrp="1"/>
-          </p:cNvSpPr>
-          <p:nvPr>
-            <p:ph type="sldNum" sz="quarter" idx="10"/>
-          </p:nvPr>
-        </p:nvSpPr>
-        <p:spPr/>
-        <p:txBody>
-          <a:bodyPr/>
-          <a:lstStyle/>
-          <a:p>
-            <a:fld id="{DA8FA8B5-ADBB-4D4D-9D16-C29BFAE63E73}" type="slidenum">
-              <a:rPr lang="fr-FR" smtClean="0"/>
-              <a:t>9</a:t>
             </a:fld>
             <a:endParaRPr lang="fr-FR"/>
           </a:p>
@@ -4447,15 +4362,7 @@
                   <a:schemeClr val="bg1"/>
                 </a:solidFill>
               </a:rPr>
-              <a:t>Présentation du c</a:t>
-            </a:r>
-            <a:r>
-              <a:rPr lang="fr-FR" sz="2400" dirty="0" smtClean="0">
-                <a:solidFill>
-                  <a:schemeClr val="bg1"/>
-                </a:solidFill>
-              </a:rPr>
-              <a:t>hallenge, méthode exacte</a:t>
+              <a:t>Présentation du challenge, méthode exacte</a:t>
             </a:r>
           </a:p>
         </p:txBody>
@@ -4610,15 +4517,7 @@
                   <a:srgbClr val="FFFFFF"/>
                 </a:solidFill>
               </a:rPr>
-              <a:t> </a:t>
-            </a:r>
-            <a:r>
-              <a:rPr lang="de-DE" sz="1400" dirty="0" smtClean="0">
-                <a:solidFill>
-                  <a:srgbClr val="FFFFFF"/>
-                </a:solidFill>
-              </a:rPr>
-              <a:t>Belkacem, </a:t>
+              <a:t> Belkacem, </a:t>
             </a:r>
             <a:r>
               <a:rPr lang="de-DE" sz="1400" b="1" dirty="0" smtClean="0">
@@ -4679,15 +4578,7 @@
                   <a:srgbClr val="FFFFFF"/>
                 </a:solidFill>
               </a:rPr>
-              <a:t> – </a:t>
-            </a:r>
-            <a:r>
-              <a:rPr lang="de-DE" sz="1400" dirty="0" smtClean="0">
-                <a:solidFill>
-                  <a:srgbClr val="FFFFFF"/>
-                </a:solidFill>
-              </a:rPr>
-              <a:t>AG41</a:t>
+              <a:t> – AG41</a:t>
             </a:r>
             <a:endParaRPr lang="de-DE" sz="1400" dirty="0">
               <a:solidFill>
@@ -5005,15 +4896,7 @@
                   <a:srgbClr val="FFFFFF"/>
                 </a:solidFill>
               </a:rPr>
-              <a:t> </a:t>
-            </a:r>
-            <a:r>
-              <a:rPr lang="de-DE" sz="1400" dirty="0" smtClean="0">
-                <a:solidFill>
-                  <a:srgbClr val="FFFFFF"/>
-                </a:solidFill>
-              </a:rPr>
-              <a:t>Belkacem, </a:t>
+              <a:t> Belkacem, </a:t>
             </a:r>
             <a:r>
               <a:rPr lang="de-DE" sz="1400" b="1" dirty="0" smtClean="0">
@@ -5074,15 +4957,7 @@
                   <a:srgbClr val="FFFFFF"/>
                 </a:solidFill>
               </a:rPr>
-              <a:t> – </a:t>
-            </a:r>
-            <a:r>
-              <a:rPr lang="de-DE" sz="1400" dirty="0" smtClean="0">
-                <a:solidFill>
-                  <a:srgbClr val="FFFFFF"/>
-                </a:solidFill>
-              </a:rPr>
-              <a:t>AG41</a:t>
+              <a:t> – AG41</a:t>
             </a:r>
             <a:endParaRPr lang="de-DE" sz="1400" dirty="0">
               <a:solidFill>
@@ -5362,15 +5237,7 @@
                   <a:srgbClr val="FFFFFF"/>
                 </a:solidFill>
               </a:rPr>
-              <a:t> </a:t>
-            </a:r>
-            <a:r>
-              <a:rPr lang="de-DE" sz="1400" dirty="0" smtClean="0">
-                <a:solidFill>
-                  <a:srgbClr val="FFFFFF"/>
-                </a:solidFill>
-              </a:rPr>
-              <a:t>Belkacem, </a:t>
+              <a:t> Belkacem, </a:t>
             </a:r>
             <a:r>
               <a:rPr lang="de-DE" sz="1400" b="1" dirty="0" smtClean="0">
@@ -5431,15 +5298,7 @@
                   <a:srgbClr val="FFFFFF"/>
                 </a:solidFill>
               </a:rPr>
-              <a:t> – </a:t>
-            </a:r>
-            <a:r>
-              <a:rPr lang="de-DE" sz="1400" dirty="0" smtClean="0">
-                <a:solidFill>
-                  <a:srgbClr val="FFFFFF"/>
-                </a:solidFill>
-              </a:rPr>
-              <a:t>AG41</a:t>
+              <a:t> – AG41</a:t>
             </a:r>
             <a:endParaRPr lang="de-DE" sz="1400" dirty="0">
               <a:solidFill>
@@ -5570,11 +5429,7 @@
             </a:r>
             <a:r>
               <a:rPr lang="fr-FR" sz="2800" dirty="0" smtClean="0"/>
-              <a:t>on essayer de regrouper un maximum les produits (hypothèse : cela aide à minimiser les co</a:t>
-            </a:r>
-            <a:r>
-              <a:rPr lang="fr-FR" sz="2800" dirty="0" smtClean="0"/>
-              <a:t>ûts)</a:t>
+              <a:t>on essayer de regrouper un maximum les produits (hypothèse : cela aide à minimiser les coûts)</a:t>
             </a:r>
           </a:p>
           <a:p>
@@ -5730,15 +5585,7 @@
                   <a:srgbClr val="FFFFFF"/>
                 </a:solidFill>
               </a:rPr>
-              <a:t> </a:t>
-            </a:r>
-            <a:r>
-              <a:rPr lang="de-DE" sz="1400" dirty="0" smtClean="0">
-                <a:solidFill>
-                  <a:srgbClr val="FFFFFF"/>
-                </a:solidFill>
-              </a:rPr>
-              <a:t>Belkacem, </a:t>
+              <a:t> Belkacem, </a:t>
             </a:r>
             <a:r>
               <a:rPr lang="de-DE" sz="1400" b="1" dirty="0" smtClean="0">
@@ -5799,15 +5646,7 @@
                   <a:srgbClr val="FFFFFF"/>
                 </a:solidFill>
               </a:rPr>
-              <a:t> – </a:t>
-            </a:r>
-            <a:r>
-              <a:rPr lang="de-DE" sz="1400" dirty="0" smtClean="0">
-                <a:solidFill>
-                  <a:srgbClr val="FFFFFF"/>
-                </a:solidFill>
-              </a:rPr>
-              <a:t>AG41</a:t>
+              <a:t> – AG41</a:t>
             </a:r>
             <a:endParaRPr lang="de-DE" sz="1400" dirty="0">
               <a:solidFill>
@@ -6100,15 +5939,7 @@
                   <a:srgbClr val="FFFFFF"/>
                 </a:solidFill>
               </a:rPr>
-              <a:t> </a:t>
-            </a:r>
-            <a:r>
-              <a:rPr lang="de-DE" sz="1400" dirty="0" smtClean="0">
-                <a:solidFill>
-                  <a:srgbClr val="FFFFFF"/>
-                </a:solidFill>
-              </a:rPr>
-              <a:t>Belkacem, </a:t>
+              <a:t> Belkacem, </a:t>
             </a:r>
             <a:r>
               <a:rPr lang="de-DE" sz="1400" b="1" dirty="0" smtClean="0">
@@ -6169,15 +6000,7 @@
                   <a:srgbClr val="FFFFFF"/>
                 </a:solidFill>
               </a:rPr>
-              <a:t> – </a:t>
-            </a:r>
-            <a:r>
-              <a:rPr lang="de-DE" sz="1400" dirty="0" smtClean="0">
-                <a:solidFill>
-                  <a:srgbClr val="FFFFFF"/>
-                </a:solidFill>
-              </a:rPr>
-              <a:t>AG41</a:t>
+              <a:t> – AG41</a:t>
             </a:r>
             <a:endParaRPr lang="de-DE" sz="1400" dirty="0">
               <a:solidFill>
@@ -6275,41 +6098,48 @@
                   <a:schemeClr val="bg1"/>
                 </a:solidFill>
               </a:rPr>
-              <a:t>Recherche dans l’arbre</a:t>
-            </a:r>
-          </a:p>
-        </p:txBody>
-      </p:sp>
-      <p:sp>
-        <p:nvSpPr>
-          <p:cNvPr id="5" name="ZoneTexte 4"/>
-          <p:cNvSpPr txBox="1"/>
+              <a:t>Recherche dans </a:t>
+            </a:r>
+            <a:r>
+              <a:rPr lang="fr-FR" sz="2400" i="1" dirty="0" smtClean="0">
+                <a:solidFill>
+                  <a:schemeClr val="bg1"/>
+                </a:solidFill>
+              </a:rPr>
+              <a:t>l’arbre + élagage</a:t>
+            </a:r>
+            <a:endParaRPr lang="fr-FR" sz="2400" i="1" dirty="0" smtClean="0">
+              <a:solidFill>
+                <a:schemeClr val="bg1"/>
+              </a:solidFill>
+            </a:endParaRPr>
+          </a:p>
+        </p:txBody>
+      </p:sp>
+      <p:pic>
+        <p:nvPicPr>
+          <p:cNvPr id="2" name="Image 1"/>
+          <p:cNvPicPr>
+            <a:picLocks noChangeAspect="1"/>
+          </p:cNvPicPr>
           <p:nvPr/>
-        </p:nvSpPr>
+        </p:nvPicPr>
+        <p:blipFill>
+          <a:blip r:embed="rId3"/>
+          <a:stretch>
+            <a:fillRect/>
+          </a:stretch>
+        </p:blipFill>
         <p:spPr>
           <a:xfrm>
-            <a:off x="1173043" y="1305277"/>
-            <a:ext cx="6789832" cy="523220"/>
+            <a:off x="1183143" y="654878"/>
+            <a:ext cx="6779732" cy="4774586"/>
           </a:xfrm>
           <a:prstGeom prst="rect">
             <a:avLst/>
           </a:prstGeom>
-          <a:noFill/>
-        </p:spPr>
-        <p:txBody>
-          <a:bodyPr wrap="square" rtlCol="0">
-            <a:spAutoFit/>
-          </a:bodyPr>
-          <a:lstStyle/>
-          <a:p>
-            <a:r>
-              <a:rPr lang="fr-FR" sz="2800" b="1" dirty="0" smtClean="0"/>
-              <a:t>On</a:t>
-            </a:r>
-            <a:endParaRPr lang="fr-FR" sz="2800" dirty="0" smtClean="0"/>
-          </a:p>
-        </p:txBody>
-      </p:sp>
+        </p:spPr>
+      </p:pic>
     </p:spTree>
     <p:extLst>
       <p:ext uri="{BB962C8B-B14F-4D97-AF65-F5344CB8AC3E}">
@@ -6436,15 +6266,7 @@
                   <a:srgbClr val="FFFFFF"/>
                 </a:solidFill>
               </a:rPr>
-              <a:t> </a:t>
-            </a:r>
-            <a:r>
-              <a:rPr lang="de-DE" sz="1400" dirty="0" smtClean="0">
-                <a:solidFill>
-                  <a:srgbClr val="FFFFFF"/>
-                </a:solidFill>
-              </a:rPr>
-              <a:t>Belkacem, </a:t>
+              <a:t> Belkacem, </a:t>
             </a:r>
             <a:r>
               <a:rPr lang="de-DE" sz="1400" b="1" dirty="0" smtClean="0">
@@ -6505,15 +6327,7 @@
                   <a:srgbClr val="FFFFFF"/>
                 </a:solidFill>
               </a:rPr>
-              <a:t> – </a:t>
-            </a:r>
-            <a:r>
-              <a:rPr lang="de-DE" sz="1400" dirty="0" smtClean="0">
-                <a:solidFill>
-                  <a:srgbClr val="FFFFFF"/>
-                </a:solidFill>
-              </a:rPr>
-              <a:t>AG41</a:t>
+              <a:t> – AG41</a:t>
             </a:r>
             <a:endParaRPr lang="de-DE" sz="1400" dirty="0">
               <a:solidFill>
@@ -6603,7 +6417,7 @@
                   <a:schemeClr val="bg1"/>
                 </a:solidFill>
               </a:rPr>
-              <a:t>Résolution exacte &gt; </a:t>
+              <a:t>Optimisation &gt; </a:t>
             </a:r>
             <a:r>
               <a:rPr lang="fr-FR" sz="2400" i="1" dirty="0" smtClean="0">
@@ -6611,7 +6425,7 @@
                   <a:schemeClr val="bg1"/>
                 </a:solidFill>
               </a:rPr>
-              <a:t>Elagage dans l’arbre de recherche</a:t>
+              <a:t>Tris et coût minimum</a:t>
             </a:r>
           </a:p>
         </p:txBody>
@@ -6625,7 +6439,7 @@
         <p:spPr>
           <a:xfrm>
             <a:off x="1173043" y="1305277"/>
-            <a:ext cx="6789832" cy="523220"/>
+            <a:ext cx="6789832" cy="2246769"/>
           </a:xfrm>
           <a:prstGeom prst="rect">
             <a:avLst/>
@@ -6640,16 +6454,45 @@
           <a:p>
             <a:r>
               <a:rPr lang="fr-FR" sz="2800" b="1" dirty="0" smtClean="0"/>
-              <a:t>On</a:t>
-            </a:r>
-            <a:endParaRPr lang="fr-FR" sz="2800" dirty="0" smtClean="0"/>
+              <a:t>Différents tris : </a:t>
+            </a:r>
+            <a:r>
+              <a:rPr lang="fr-FR" sz="2800" dirty="0" smtClean="0"/>
+              <a:t>taille des </a:t>
+            </a:r>
+            <a:r>
+              <a:rPr lang="fr-FR" sz="2800" dirty="0" err="1" smtClean="0"/>
+              <a:t>batchs</a:t>
+            </a:r>
+            <a:r>
+              <a:rPr lang="fr-FR" sz="2800" dirty="0" smtClean="0"/>
+              <a:t>, date due, coefficients de stockage…</a:t>
+            </a:r>
+          </a:p>
+          <a:p>
+            <a:endParaRPr lang="fr-FR" sz="2800" b="1" dirty="0" smtClean="0"/>
+          </a:p>
+          <a:p>
+            <a:r>
+              <a:rPr lang="fr-FR" sz="2800" b="1" dirty="0" smtClean="0"/>
+              <a:t>Co</a:t>
+            </a:r>
+            <a:r>
+              <a:rPr lang="fr-FR" sz="2800" b="1" dirty="0" smtClean="0"/>
+              <a:t>ût minimum : </a:t>
+            </a:r>
+            <a:r>
+              <a:rPr lang="fr-FR" sz="2800" dirty="0" smtClean="0"/>
+              <a:t>soit juste au début, soit à chaque itération</a:t>
+            </a:r>
+            <a:endParaRPr lang="fr-FR" sz="2800" b="1" dirty="0" smtClean="0"/>
           </a:p>
         </p:txBody>
       </p:sp>
     </p:spTree>
     <p:extLst>
       <p:ext uri="{BB962C8B-B14F-4D97-AF65-F5344CB8AC3E}">
-        <p14:creationId xmlns:p14="http://schemas.microsoft.com/office/powerpoint/2010/main" val="2312014624"/>
+        <p14:creationId xmlns:p14="http://schemas.microsoft.com/office/powerpoint/2010/main" val="2283226031"/>
       </p:ext>
     </p:extLst>
   </p:cSld>
@@ -6772,15 +6615,7 @@
                   <a:srgbClr val="FFFFFF"/>
                 </a:solidFill>
               </a:rPr>
-              <a:t> </a:t>
-            </a:r>
-            <a:r>
-              <a:rPr lang="de-DE" sz="1400" dirty="0" smtClean="0">
-                <a:solidFill>
-                  <a:srgbClr val="FFFFFF"/>
-                </a:solidFill>
-              </a:rPr>
-              <a:t>Belkacem, </a:t>
+              <a:t> Belkacem, </a:t>
             </a:r>
             <a:r>
               <a:rPr lang="de-DE" sz="1400" b="1" dirty="0" smtClean="0">
@@ -6841,15 +6676,7 @@
                   <a:srgbClr val="FFFFFF"/>
                 </a:solidFill>
               </a:rPr>
-              <a:t> – </a:t>
-            </a:r>
-            <a:r>
-              <a:rPr lang="de-DE" sz="1400" dirty="0" smtClean="0">
-                <a:solidFill>
-                  <a:srgbClr val="FFFFFF"/>
-                </a:solidFill>
-              </a:rPr>
-              <a:t>AG41</a:t>
+              <a:t> – AG41</a:t>
             </a:r>
             <a:endParaRPr lang="de-DE" sz="1400" dirty="0">
               <a:solidFill>
@@ -6939,7 +6766,7 @@
                   <a:schemeClr val="bg1"/>
                 </a:solidFill>
               </a:rPr>
-              <a:t>Optimisation &gt; </a:t>
+              <a:t>Conclusion &gt; </a:t>
             </a:r>
             <a:r>
               <a:rPr lang="fr-FR" sz="2400" i="1" dirty="0" smtClean="0">
@@ -6947,21 +6774,8 @@
                   <a:schemeClr val="bg1"/>
                 </a:solidFill>
               </a:rPr>
-              <a:t>Tris et co</a:t>
-            </a:r>
-            <a:r>
-              <a:rPr lang="fr-FR" sz="2400" i="1" dirty="0" smtClean="0">
-                <a:solidFill>
-                  <a:schemeClr val="bg1"/>
-                </a:solidFill>
-              </a:rPr>
-              <a:t>ût minimum</a:t>
-            </a:r>
-            <a:endParaRPr lang="fr-FR" sz="2400" i="1" dirty="0" smtClean="0">
-              <a:solidFill>
-                <a:schemeClr val="bg1"/>
-              </a:solidFill>
-            </a:endParaRPr>
+              <a:t>&amp; améliorations possibles</a:t>
+            </a:r>
           </a:p>
         </p:txBody>
       </p:sp>
@@ -6973,8 +6787,8 @@
         </p:nvSpPr>
         <p:spPr>
           <a:xfrm>
-            <a:off x="1173043" y="1305277"/>
-            <a:ext cx="6789832" cy="523220"/>
+            <a:off x="1173043" y="1137708"/>
+            <a:ext cx="6789832" cy="3539431"/>
           </a:xfrm>
           <a:prstGeom prst="rect">
             <a:avLst/>
@@ -6989,345 +6803,55 @@
           <a:p>
             <a:r>
               <a:rPr lang="fr-FR" sz="2800" b="1" dirty="0" smtClean="0"/>
-              <a:t>On</a:t>
-            </a:r>
-            <a:endParaRPr lang="fr-FR" sz="2800" dirty="0" smtClean="0"/>
-          </a:p>
-        </p:txBody>
-      </p:sp>
-    </p:spTree>
-    <p:extLst>
-      <p:ext uri="{BB962C8B-B14F-4D97-AF65-F5344CB8AC3E}">
-        <p14:creationId xmlns:p14="http://schemas.microsoft.com/office/powerpoint/2010/main" val="2283226031"/>
-      </p:ext>
-    </p:extLst>
-  </p:cSld>
-  <p:clrMapOvr>
-    <a:masterClrMapping/>
-  </p:clrMapOvr>
-  <p:transition xmlns:p14="http://schemas.microsoft.com/office/powerpoint/2010/main" spd="slow">
-    <p:push/>
-  </p:transition>
-  <p:timing>
-    <p:tnLst>
-      <p:par>
-        <p:cTn xmlns:p14="http://schemas.microsoft.com/office/powerpoint/2010/main" id="1" dur="indefinite" restart="never" nodeType="tmRoot"/>
-      </p:par>
-    </p:tnLst>
-  </p:timing>
-</p:sld>
-</file>
-
-<file path=ppt/slides/slide9.xml><?xml version="1.0" encoding="utf-8"?>
-<p:sld xmlns:a="http://schemas.openxmlformats.org/drawingml/2006/main" xmlns:r="http://schemas.openxmlformats.org/officeDocument/2006/relationships" xmlns:p="http://schemas.openxmlformats.org/presentationml/2006/main">
-  <p:cSld>
-    <p:spTree>
-      <p:nvGrpSpPr>
-        <p:cNvPr id="1" name=""/>
-        <p:cNvGrpSpPr/>
-        <p:nvPr/>
-      </p:nvGrpSpPr>
-      <p:grpSpPr>
-        <a:xfrm>
-          <a:off x="0" y="0"/>
-          <a:ext cx="0" cy="0"/>
-          <a:chOff x="0" y="0"/>
-          <a:chExt cx="0" cy="0"/>
-        </a:xfrm>
-      </p:grpSpPr>
-      <p:sp>
-        <p:nvSpPr>
-          <p:cNvPr id="3" name="Rectangle 2"/>
-          <p:cNvSpPr/>
-          <p:nvPr/>
-        </p:nvSpPr>
-        <p:spPr>
-          <a:xfrm>
-            <a:off x="0" y="5429464"/>
-            <a:ext cx="9152524" cy="285537"/>
-          </a:xfrm>
-          <a:prstGeom prst="rect">
-            <a:avLst/>
-          </a:prstGeom>
-          <a:solidFill>
-            <a:schemeClr val="tx2">
-              <a:lumMod val="75000"/>
-            </a:schemeClr>
-          </a:solidFill>
-          <a:ln>
-            <a:noFill/>
-          </a:ln>
-          <a:effectLst/>
-        </p:spPr>
-        <p:style>
-          <a:lnRef idx="1">
-            <a:schemeClr val="accent1"/>
-          </a:lnRef>
-          <a:fillRef idx="3">
-            <a:schemeClr val="accent1"/>
-          </a:fillRef>
-          <a:effectRef idx="2">
-            <a:schemeClr val="accent1"/>
-          </a:effectRef>
-          <a:fontRef idx="minor">
-            <a:schemeClr val="lt1"/>
-          </a:fontRef>
-        </p:style>
-        <p:txBody>
-          <a:bodyPr rtlCol="0" anchor="ctr"/>
-          <a:lstStyle/>
-          <a:p>
-            <a:pPr algn="ctr"/>
-            <a:endParaRPr lang="de-DE">
-              <a:solidFill>
-                <a:schemeClr val="tx1"/>
-              </a:solidFill>
-            </a:endParaRPr>
-          </a:p>
-        </p:txBody>
-      </p:sp>
-      <p:sp>
-        <p:nvSpPr>
-          <p:cNvPr id="6" name="Rectangle 5"/>
-          <p:cNvSpPr/>
-          <p:nvPr/>
-        </p:nvSpPr>
-        <p:spPr>
-          <a:xfrm>
-            <a:off x="0" y="5429464"/>
-            <a:ext cx="3749163" cy="307777"/>
-          </a:xfrm>
-          <a:prstGeom prst="rect">
-            <a:avLst/>
-          </a:prstGeom>
-        </p:spPr>
-        <p:txBody>
-          <a:bodyPr wrap="square">
-            <a:spAutoFit/>
-          </a:bodyPr>
-          <a:lstStyle/>
-          <a:p>
-            <a:r>
-              <a:rPr lang="de-DE" sz="1400" b="1" dirty="0" smtClean="0">
-                <a:solidFill>
-                  <a:srgbClr val="FFFFFF"/>
-                </a:solidFill>
-              </a:rPr>
-              <a:t>LAHOUEL</a:t>
-            </a:r>
-            <a:r>
-              <a:rPr lang="de-DE" sz="1400" dirty="0" smtClean="0">
-                <a:solidFill>
-                  <a:srgbClr val="FFFFFF"/>
-                </a:solidFill>
-              </a:rPr>
-              <a:t> </a:t>
-            </a:r>
-            <a:r>
-              <a:rPr lang="de-DE" sz="1400" dirty="0" smtClean="0">
-                <a:solidFill>
-                  <a:srgbClr val="FFFFFF"/>
-                </a:solidFill>
-              </a:rPr>
-              <a:t>Belkacem, </a:t>
-            </a:r>
-            <a:r>
-              <a:rPr lang="de-DE" sz="1400" b="1" dirty="0" smtClean="0">
-                <a:solidFill>
-                  <a:srgbClr val="FFFFFF"/>
-                </a:solidFill>
-              </a:rPr>
-              <a:t>CADORET</a:t>
-            </a:r>
-            <a:r>
-              <a:rPr lang="de-DE" sz="1400" dirty="0" smtClean="0">
-                <a:solidFill>
-                  <a:srgbClr val="FFFFFF"/>
-                </a:solidFill>
-              </a:rPr>
-              <a:t> Luc</a:t>
-            </a:r>
-            <a:endParaRPr lang="de-DE" sz="1400" dirty="0">
-              <a:solidFill>
-                <a:srgbClr val="FFFFFF"/>
-              </a:solidFill>
-            </a:endParaRPr>
-          </a:p>
-        </p:txBody>
-      </p:sp>
-      <p:sp>
-        <p:nvSpPr>
-          <p:cNvPr id="7" name="Rectangle 6"/>
-          <p:cNvSpPr/>
-          <p:nvPr/>
-        </p:nvSpPr>
-        <p:spPr>
-          <a:xfrm>
-            <a:off x="7962875" y="5407223"/>
-            <a:ext cx="1218052" cy="307777"/>
-          </a:xfrm>
-          <a:prstGeom prst="rect">
-            <a:avLst/>
-          </a:prstGeom>
-        </p:spPr>
-        <p:txBody>
-          <a:bodyPr wrap="none">
-            <a:spAutoFit/>
-          </a:bodyPr>
-          <a:lstStyle/>
-          <a:p>
-            <a:r>
-              <a:rPr lang="de-DE" sz="1400" b="1" dirty="0" smtClean="0">
-                <a:solidFill>
-                  <a:srgbClr val="FFFFFF"/>
-                </a:solidFill>
-              </a:rPr>
-              <a:t>UTBM</a:t>
-            </a:r>
-            <a:r>
-              <a:rPr lang="de-DE" sz="1400" dirty="0" smtClean="0">
-                <a:solidFill>
-                  <a:srgbClr val="FFFFFF"/>
-                </a:solidFill>
-              </a:rPr>
-              <a:t> – </a:t>
-            </a:r>
-            <a:r>
-              <a:rPr lang="de-DE" sz="1400" dirty="0" smtClean="0">
-                <a:solidFill>
-                  <a:srgbClr val="FFFFFF"/>
-                </a:solidFill>
-              </a:rPr>
-              <a:t>AG41</a:t>
-            </a:r>
-            <a:endParaRPr lang="de-DE" sz="1400" dirty="0">
-              <a:solidFill>
-                <a:srgbClr val="FFFFFF"/>
-              </a:solidFill>
-            </a:endParaRPr>
-          </a:p>
-        </p:txBody>
-      </p:sp>
-      <p:sp>
-        <p:nvSpPr>
-          <p:cNvPr id="11" name="Rectangle 10"/>
-          <p:cNvSpPr/>
-          <p:nvPr/>
-        </p:nvSpPr>
-        <p:spPr>
-          <a:xfrm>
-            <a:off x="0" y="0"/>
-            <a:ext cx="9144000" cy="617299"/>
-          </a:xfrm>
-          <a:prstGeom prst="rect">
-            <a:avLst/>
-          </a:prstGeom>
-          <a:solidFill>
-            <a:schemeClr val="tx2">
-              <a:lumMod val="75000"/>
-            </a:schemeClr>
-          </a:solidFill>
-          <a:ln>
-            <a:noFill/>
-          </a:ln>
-          <a:effectLst/>
-        </p:spPr>
-        <p:style>
-          <a:lnRef idx="1">
-            <a:schemeClr val="accent1"/>
-          </a:lnRef>
-          <a:fillRef idx="3">
-            <a:schemeClr val="accent1"/>
-          </a:fillRef>
-          <a:effectRef idx="2">
-            <a:schemeClr val="accent1"/>
-          </a:effectRef>
-          <a:fontRef idx="minor">
-            <a:schemeClr val="lt1"/>
-          </a:fontRef>
-        </p:style>
-        <p:txBody>
-          <a:bodyPr rtlCol="0" anchor="ctr"/>
-          <a:lstStyle/>
-          <a:p>
-            <a:pPr algn="ctr"/>
-            <a:endParaRPr lang="de-DE">
-              <a:solidFill>
-                <a:schemeClr val="tx1"/>
-              </a:solidFill>
-            </a:endParaRPr>
-          </a:p>
-        </p:txBody>
-      </p:sp>
-      <p:sp>
-        <p:nvSpPr>
-          <p:cNvPr id="12" name="ZoneTexte 11"/>
-          <p:cNvSpPr txBox="1"/>
-          <p:nvPr/>
-        </p:nvSpPr>
-        <p:spPr>
-          <a:xfrm>
-            <a:off x="0" y="98808"/>
-            <a:ext cx="9144000" cy="461665"/>
-          </a:xfrm>
-          <a:prstGeom prst="rect">
-            <a:avLst/>
-          </a:prstGeom>
-          <a:noFill/>
-        </p:spPr>
-        <p:txBody>
-          <a:bodyPr wrap="square" rtlCol="0">
-            <a:spAutoFit/>
-          </a:bodyPr>
-          <a:lstStyle/>
-          <a:p>
-            <a:pPr algn="ctr"/>
-            <a:r>
-              <a:rPr lang="fr-FR" sz="2400" b="1" dirty="0" smtClean="0">
-                <a:solidFill>
-                  <a:schemeClr val="bg1"/>
-                </a:solidFill>
-              </a:rPr>
-              <a:t>Conclusion &gt; </a:t>
-            </a:r>
-            <a:r>
-              <a:rPr lang="fr-FR" sz="2400" i="1" dirty="0" smtClean="0">
-                <a:solidFill>
-                  <a:schemeClr val="bg1"/>
-                </a:solidFill>
-              </a:rPr>
-              <a:t>&amp; améliorations possibles</a:t>
-            </a:r>
-          </a:p>
-        </p:txBody>
-      </p:sp>
-      <p:sp>
-        <p:nvSpPr>
-          <p:cNvPr id="5" name="ZoneTexte 4"/>
-          <p:cNvSpPr txBox="1"/>
-          <p:nvPr/>
-        </p:nvSpPr>
-        <p:spPr>
-          <a:xfrm>
-            <a:off x="1173043" y="1305277"/>
-            <a:ext cx="6789832" cy="523220"/>
-          </a:xfrm>
-          <a:prstGeom prst="rect">
-            <a:avLst/>
-          </a:prstGeom>
-          <a:noFill/>
-        </p:spPr>
-        <p:txBody>
-          <a:bodyPr wrap="square" rtlCol="0">
-            <a:spAutoFit/>
-          </a:bodyPr>
-          <a:lstStyle/>
+              <a:t>Threads</a:t>
+            </a:r>
+          </a:p>
           <a:p>
             <a:r>
               <a:rPr lang="fr-FR" sz="2800" b="1" dirty="0" smtClean="0"/>
-              <a:t>On</a:t>
-            </a:r>
-            <a:endParaRPr lang="fr-FR" sz="2800" dirty="0" smtClean="0"/>
+              <a:t>Heuristique(s)</a:t>
+            </a:r>
+          </a:p>
+          <a:p>
+            <a:r>
+              <a:rPr lang="fr-FR" sz="2800" b="1" dirty="0" err="1" smtClean="0"/>
+              <a:t>Cuts</a:t>
+            </a:r>
+            <a:r>
+              <a:rPr lang="fr-FR" sz="2800" b="1" dirty="0" smtClean="0"/>
+              <a:t> : </a:t>
+            </a:r>
+            <a:r>
+              <a:rPr lang="fr-FR" sz="2800" dirty="0" smtClean="0"/>
+              <a:t>co</a:t>
+            </a:r>
+            <a:r>
+              <a:rPr lang="fr-FR" sz="2800" dirty="0" smtClean="0"/>
+              <a:t>ût minimum et évaluation, …</a:t>
+            </a:r>
+            <a:endParaRPr lang="fr-FR" sz="2800" b="1" dirty="0" smtClean="0"/>
+          </a:p>
+          <a:p>
+            <a:endParaRPr lang="fr-FR" sz="2800" b="1" dirty="0" smtClean="0"/>
+          </a:p>
+          <a:p>
+            <a:r>
+              <a:rPr lang="fr-FR" sz="2800" b="1" dirty="0" smtClean="0"/>
+              <a:t>Sujet ambigu mais challenge </a:t>
+            </a:r>
+            <a:r>
+              <a:rPr lang="fr-FR" sz="2800" b="1" dirty="0" err="1" smtClean="0"/>
+              <a:t>successful</a:t>
+            </a:r>
+            <a:r>
+              <a:rPr lang="fr-FR" sz="2800" b="1" dirty="0" smtClean="0"/>
+              <a:t> : </a:t>
+            </a:r>
+            <a:r>
+              <a:rPr lang="fr-FR" sz="2800" dirty="0" smtClean="0"/>
+              <a:t>bons résultats, pas de fuites mémoire, assez rapide, on peut prouver que la solution trouvée est la meilleure.</a:t>
+            </a:r>
+            <a:endParaRPr lang="fr-FR" sz="2800" b="1" dirty="0" smtClean="0"/>
           </a:p>
         </p:txBody>
       </p:sp>

</xml_diff>